<commit_message>
Add a test for table.
</commit_message>
<xml_diff>
--- a/test/ShapeCrawler.Tests.Unit/Resource/053_add_shapes.pptx
+++ b/test/ShapeCrawler.Tests.Unit/Resource/053_add_shapes.pptx
@@ -244,7 +244,7 @@
           <a:p>
             <a:fld id="{606ECCC5-4546-4098-9A3E-05B68676E7CD}" type="datetimeFigureOut">
               <a:rPr lang="es-MX" smtClean="0"/>
-              <a:t>29/06/2023</a:t>
+              <a:t>04/07/2023</a:t>
             </a:fld>
             <a:endParaRPr lang="es-MX"/>
           </a:p>
@@ -414,7 +414,7 @@
           <a:p>
             <a:fld id="{606ECCC5-4546-4098-9A3E-05B68676E7CD}" type="datetimeFigureOut">
               <a:rPr lang="es-MX" smtClean="0"/>
-              <a:t>29/06/2023</a:t>
+              <a:t>04/07/2023</a:t>
             </a:fld>
             <a:endParaRPr lang="es-MX"/>
           </a:p>
@@ -594,7 +594,7 @@
           <a:p>
             <a:fld id="{606ECCC5-4546-4098-9A3E-05B68676E7CD}" type="datetimeFigureOut">
               <a:rPr lang="es-MX" smtClean="0"/>
-              <a:t>29/06/2023</a:t>
+              <a:t>04/07/2023</a:t>
             </a:fld>
             <a:endParaRPr lang="es-MX"/>
           </a:p>
@@ -764,7 +764,7 @@
           <a:p>
             <a:fld id="{606ECCC5-4546-4098-9A3E-05B68676E7CD}" type="datetimeFigureOut">
               <a:rPr lang="es-MX" smtClean="0"/>
-              <a:t>29/06/2023</a:t>
+              <a:t>04/07/2023</a:t>
             </a:fld>
             <a:endParaRPr lang="es-MX"/>
           </a:p>
@@ -1010,7 +1010,7 @@
           <a:p>
             <a:fld id="{606ECCC5-4546-4098-9A3E-05B68676E7CD}" type="datetimeFigureOut">
               <a:rPr lang="es-MX" smtClean="0"/>
-              <a:t>29/06/2023</a:t>
+              <a:t>04/07/2023</a:t>
             </a:fld>
             <a:endParaRPr lang="es-MX"/>
           </a:p>
@@ -1242,7 +1242,7 @@
           <a:p>
             <a:fld id="{606ECCC5-4546-4098-9A3E-05B68676E7CD}" type="datetimeFigureOut">
               <a:rPr lang="es-MX" smtClean="0"/>
-              <a:t>29/06/2023</a:t>
+              <a:t>04/07/2023</a:t>
             </a:fld>
             <a:endParaRPr lang="es-MX"/>
           </a:p>
@@ -1609,7 +1609,7 @@
           <a:p>
             <a:fld id="{606ECCC5-4546-4098-9A3E-05B68676E7CD}" type="datetimeFigureOut">
               <a:rPr lang="es-MX" smtClean="0"/>
-              <a:t>29/06/2023</a:t>
+              <a:t>04/07/2023</a:t>
             </a:fld>
             <a:endParaRPr lang="es-MX"/>
           </a:p>
@@ -1727,7 +1727,7 @@
           <a:p>
             <a:fld id="{606ECCC5-4546-4098-9A3E-05B68676E7CD}" type="datetimeFigureOut">
               <a:rPr lang="es-MX" smtClean="0"/>
-              <a:t>29/06/2023</a:t>
+              <a:t>04/07/2023</a:t>
             </a:fld>
             <a:endParaRPr lang="es-MX"/>
           </a:p>
@@ -1822,7 +1822,7 @@
           <a:p>
             <a:fld id="{606ECCC5-4546-4098-9A3E-05B68676E7CD}" type="datetimeFigureOut">
               <a:rPr lang="es-MX" smtClean="0"/>
-              <a:t>29/06/2023</a:t>
+              <a:t>04/07/2023</a:t>
             </a:fld>
             <a:endParaRPr lang="es-MX"/>
           </a:p>
@@ -2099,7 +2099,7 @@
           <a:p>
             <a:fld id="{606ECCC5-4546-4098-9A3E-05B68676E7CD}" type="datetimeFigureOut">
               <a:rPr lang="es-MX" smtClean="0"/>
-              <a:t>29/06/2023</a:t>
+              <a:t>04/07/2023</a:t>
             </a:fld>
             <a:endParaRPr lang="es-MX"/>
           </a:p>
@@ -2352,7 +2352,7 @@
           <a:p>
             <a:fld id="{606ECCC5-4546-4098-9A3E-05B68676E7CD}" type="datetimeFigureOut">
               <a:rPr lang="es-MX" smtClean="0"/>
-              <a:t>29/06/2023</a:t>
+              <a:t>04/07/2023</a:t>
             </a:fld>
             <a:endParaRPr lang="es-MX"/>
           </a:p>
@@ -2565,7 +2565,7 @@
           <a:p>
             <a:fld id="{606ECCC5-4546-4098-9A3E-05B68676E7CD}" type="datetimeFigureOut">
               <a:rPr lang="es-MX" smtClean="0"/>
-              <a:t>29/06/2023</a:t>
+              <a:t>04/07/2023</a:t>
             </a:fld>
             <a:endParaRPr lang="es-MX"/>
           </a:p>
@@ -3060,6 +3060,104 @@
           </a:p>
         </p:txBody>
       </p:sp>
+      <p:graphicFrame>
+        <p:nvGraphicFramePr>
+          <p:cNvPr id="3" name="Table 1"/>
+          <p:cNvGraphicFramePr>
+            <a:graphicFrameLocks noGrp="1"/>
+          </p:cNvGraphicFramePr>
+          <p:nvPr>
+            <p:extLst>
+              <p:ext uri="{D42A27DB-BD31-4B8C-83A1-F6EECF244321}">
+                <p14:modId xmlns:p14="http://schemas.microsoft.com/office/powerpoint/2010/main" val="2420588634"/>
+              </p:ext>
+            </p:extLst>
+          </p:nvPr>
+        </p:nvGraphicFramePr>
+        <p:xfrm>
+          <a:off x="2032000" y="719666"/>
+          <a:ext cx="8128000" cy="741680"/>
+        </p:xfrm>
+        <a:graphic>
+          <a:graphicData uri="http://schemas.openxmlformats.org/drawingml/2006/table">
+            <a:tbl>
+              <a:tblPr firstRow="1" bandRow="1">
+                <a:tableStyleId>{5C22544A-7EE6-4342-B048-85BDC9FD1C3A}</a:tableStyleId>
+              </a:tblPr>
+              <a:tblGrid>
+                <a:gridCol w="4064000">
+                  <a:extLst>
+                    <a:ext uri="{9D8B030D-6E8A-4147-A177-3AD203B41FA5}">
+                      <a16:colId xmlns:a16="http://schemas.microsoft.com/office/drawing/2014/main" val="248820709"/>
+                    </a:ext>
+                  </a:extLst>
+                </a:gridCol>
+                <a:gridCol w="4064000">
+                  <a:extLst>
+                    <a:ext uri="{9D8B030D-6E8A-4147-A177-3AD203B41FA5}">
+                      <a16:colId xmlns:a16="http://schemas.microsoft.com/office/drawing/2014/main" val="2722824243"/>
+                    </a:ext>
+                  </a:extLst>
+                </a:gridCol>
+              </a:tblGrid>
+              <a:tr h="370840">
+                <a:tc>
+                  <a:txBody>
+                    <a:bodyPr/>
+                    <a:lstStyle/>
+                    <a:p>
+                      <a:endParaRPr lang="es-MX" dirty="0"/>
+                    </a:p>
+                  </a:txBody>
+                  <a:tcPr/>
+                </a:tc>
+                <a:tc>
+                  <a:txBody>
+                    <a:bodyPr/>
+                    <a:lstStyle/>
+                    <a:p>
+                      <a:endParaRPr lang="es-MX"/>
+                    </a:p>
+                  </a:txBody>
+                  <a:tcPr/>
+                </a:tc>
+                <a:extLst>
+                  <a:ext uri="{0D108BD9-81ED-4DB2-BD59-A6C34878D82A}">
+                    <a16:rowId xmlns:a16="http://schemas.microsoft.com/office/drawing/2014/main" val="3937994553"/>
+                  </a:ext>
+                </a:extLst>
+              </a:tr>
+              <a:tr h="370840">
+                <a:tc>
+                  <a:txBody>
+                    <a:bodyPr/>
+                    <a:lstStyle/>
+                    <a:p>
+                      <a:endParaRPr lang="es-MX"/>
+                    </a:p>
+                  </a:txBody>
+                  <a:tcPr/>
+                </a:tc>
+                <a:tc>
+                  <a:txBody>
+                    <a:bodyPr/>
+                    <a:lstStyle/>
+                    <a:p>
+                      <a:endParaRPr lang="es-MX" dirty="0"/>
+                    </a:p>
+                  </a:txBody>
+                  <a:tcPr/>
+                </a:tc>
+                <a:extLst>
+                  <a:ext uri="{0D108BD9-81ED-4DB2-BD59-A6C34878D82A}">
+                    <a16:rowId xmlns:a16="http://schemas.microsoft.com/office/drawing/2014/main" val="1359735071"/>
+                  </a:ext>
+                </a:extLst>
+              </a:tr>
+            </a:tbl>
+          </a:graphicData>
+        </a:graphic>
+      </p:graphicFrame>
     </p:spTree>
     <p:extLst>
       <p:ext uri="{BB962C8B-B14F-4D97-AF65-F5344CB8AC3E}">

</xml_diff>